<commit_message>
annimation and other fixws
</commit_message>
<xml_diff>
--- a/presentation.pptx
+++ b/presentation.pptx
@@ -4541,36 +4541,6 @@
           <a:chExt cx="0" cy="0"/>
         </a:xfrm>
       </p:grpSpPr>
-      <p:pic>
-        <p:nvPicPr>
-          <p:cNvPr id="15" name="Picture 14">
-            <a:extLst>
-              <a:ext uri="{FF2B5EF4-FFF2-40B4-BE49-F238E27FC236}">
-                <a16:creationId xmlns:a16="http://schemas.microsoft.com/office/drawing/2014/main" id="{E5C828B7-6B9A-EA46-9AB6-A115F9F8362C}"/>
-              </a:ext>
-            </a:extLst>
-          </p:cNvPr>
-          <p:cNvPicPr>
-            <a:picLocks noChangeAspect="1"/>
-          </p:cNvPicPr>
-          <p:nvPr/>
-        </p:nvPicPr>
-        <p:blipFill>
-          <a:blip r:embed="rId2"/>
-          <a:stretch>
-            <a:fillRect/>
-          </a:stretch>
-        </p:blipFill>
-        <p:spPr>
-          <a:xfrm>
-            <a:off x="6305433" y="4911652"/>
-            <a:ext cx="2451100" cy="406400"/>
-          </a:xfrm>
-          <a:prstGeom prst="rect">
-            <a:avLst/>
-          </a:prstGeom>
-        </p:spPr>
-      </p:pic>
       <p:sp>
         <p:nvSpPr>
           <p:cNvPr id="2" name="Title 1">
@@ -4663,7 +4633,7 @@
             </a:r>
             <a:r>
               <a:rPr lang="en-US" dirty="0"/>
-              <a:t> For any function  whose </a:t>
+              <a:t> For any function whose </a:t>
             </a:r>
             <a:r>
               <a:rPr lang="en-US" dirty="0">
@@ -4764,6 +4734,36 @@
           <p:nvPr/>
         </p:nvPicPr>
         <p:blipFill>
+          <a:blip r:embed="rId2"/>
+          <a:stretch>
+            <a:fillRect/>
+          </a:stretch>
+        </p:blipFill>
+        <p:spPr>
+          <a:xfrm>
+            <a:off x="4655670" y="3958856"/>
+            <a:ext cx="889000" cy="317500"/>
+          </a:xfrm>
+          <a:prstGeom prst="rect">
+            <a:avLst/>
+          </a:prstGeom>
+        </p:spPr>
+      </p:pic>
+      <p:pic>
+        <p:nvPicPr>
+          <p:cNvPr id="19" name="Picture 18">
+            <a:extLst>
+              <a:ext uri="{FF2B5EF4-FFF2-40B4-BE49-F238E27FC236}">
+                <a16:creationId xmlns:a16="http://schemas.microsoft.com/office/drawing/2014/main" id="{9A842BDB-D27C-5D43-9A06-A190ED565CF3}"/>
+              </a:ext>
+            </a:extLst>
+          </p:cNvPr>
+          <p:cNvPicPr>
+            <a:picLocks noChangeAspect="1"/>
+          </p:cNvPicPr>
+          <p:nvPr/>
+        </p:nvPicPr>
+        <p:blipFill>
           <a:blip r:embed="rId3"/>
           <a:stretch>
             <a:fillRect/>
@@ -4771,8 +4771,8 @@
         </p:blipFill>
         <p:spPr>
           <a:xfrm>
-            <a:off x="4655670" y="3958856"/>
-            <a:ext cx="889000" cy="317500"/>
+            <a:off x="5283083" y="1686109"/>
+            <a:ext cx="4495800" cy="863600"/>
           </a:xfrm>
           <a:prstGeom prst="rect">
             <a:avLst/>
@@ -4781,10 +4781,10 @@
       </p:pic>
       <p:pic>
         <p:nvPicPr>
-          <p:cNvPr id="14" name="Picture 13">
-            <a:extLst>
-              <a:ext uri="{FF2B5EF4-FFF2-40B4-BE49-F238E27FC236}">
-                <a16:creationId xmlns:a16="http://schemas.microsoft.com/office/drawing/2014/main" id="{9648CF5A-9BB9-E74B-B846-94F987985C37}"/>
+          <p:cNvPr id="20" name="Picture 19">
+            <a:extLst>
+              <a:ext uri="{FF2B5EF4-FFF2-40B4-BE49-F238E27FC236}">
+                <a16:creationId xmlns:a16="http://schemas.microsoft.com/office/drawing/2014/main" id="{19C4F853-DA0E-8F42-A9BA-50C2037CBF7F}"/>
               </a:ext>
             </a:extLst>
           </p:cNvPr>
@@ -4801,8 +4801,8 @@
         </p:blipFill>
         <p:spPr>
           <a:xfrm>
-            <a:off x="8098373" y="5922714"/>
-            <a:ext cx="2946400" cy="368300"/>
+            <a:off x="8694765" y="2936782"/>
+            <a:ext cx="1955800" cy="317500"/>
           </a:xfrm>
           <a:prstGeom prst="rect">
             <a:avLst/>
@@ -4811,10 +4811,10 @@
       </p:pic>
       <p:pic>
         <p:nvPicPr>
-          <p:cNvPr id="19" name="Picture 18">
-            <a:extLst>
-              <a:ext uri="{FF2B5EF4-FFF2-40B4-BE49-F238E27FC236}">
-                <a16:creationId xmlns:a16="http://schemas.microsoft.com/office/drawing/2014/main" id="{9A842BDB-D27C-5D43-9A06-A190ED565CF3}"/>
+          <p:cNvPr id="4" name="Picture 3">
+            <a:extLst>
+              <a:ext uri="{FF2B5EF4-FFF2-40B4-BE49-F238E27FC236}">
+                <a16:creationId xmlns:a16="http://schemas.microsoft.com/office/drawing/2014/main" id="{84C9AC6A-489D-FF46-9EF7-7BB251F68241}"/>
               </a:ext>
             </a:extLst>
           </p:cNvPr>
@@ -4831,8 +4831,8 @@
         </p:blipFill>
         <p:spPr>
           <a:xfrm>
-            <a:off x="5283083" y="1686109"/>
-            <a:ext cx="4495800" cy="863600"/>
+            <a:off x="8083550" y="5961025"/>
+            <a:ext cx="3327400" cy="406400"/>
           </a:xfrm>
           <a:prstGeom prst="rect">
             <a:avLst/>
@@ -4841,10 +4841,10 @@
       </p:pic>
       <p:pic>
         <p:nvPicPr>
-          <p:cNvPr id="20" name="Picture 19">
-            <a:extLst>
-              <a:ext uri="{FF2B5EF4-FFF2-40B4-BE49-F238E27FC236}">
-                <a16:creationId xmlns:a16="http://schemas.microsoft.com/office/drawing/2014/main" id="{19C4F853-DA0E-8F42-A9BA-50C2037CBF7F}"/>
+          <p:cNvPr id="5" name="Picture 4">
+            <a:extLst>
+              <a:ext uri="{FF2B5EF4-FFF2-40B4-BE49-F238E27FC236}">
+                <a16:creationId xmlns:a16="http://schemas.microsoft.com/office/drawing/2014/main" id="{73D1410B-A7A4-E844-BBA9-631139024FB2}"/>
               </a:ext>
             </a:extLst>
           </p:cNvPr>
@@ -4861,8 +4861,8 @@
         </p:blipFill>
         <p:spPr>
           <a:xfrm>
-            <a:off x="8694765" y="2936782"/>
-            <a:ext cx="1955800" cy="317500"/>
+            <a:off x="6191133" y="4898804"/>
+            <a:ext cx="2679700" cy="406400"/>
           </a:xfrm>
           <a:prstGeom prst="rect">
             <a:avLst/>
@@ -8954,9 +8954,9 @@
         <p:grpSpPr>
           <a:xfrm>
             <a:off x="572135" y="4120791"/>
-            <a:ext cx="10730117" cy="954107"/>
+            <a:ext cx="10407016" cy="954107"/>
             <a:chOff x="572135" y="4415938"/>
-            <a:chExt cx="10730117" cy="954107"/>
+            <a:chExt cx="10407016" cy="954107"/>
           </a:xfrm>
         </p:grpSpPr>
         <p:sp>
@@ -8974,7 +8974,7 @@
           <p:spPr>
             <a:xfrm>
               <a:off x="572135" y="4415938"/>
-              <a:ext cx="10730117" cy="954107"/>
+              <a:ext cx="10407016" cy="954107"/>
             </a:xfrm>
             <a:prstGeom prst="rect">
               <a:avLst/>
@@ -8989,7 +8989,7 @@
             <a:p>
               <a:r>
                 <a:rPr lang="en-US" sz="2800" dirty="0"/>
-                <a:t>Lemma [L, </a:t>
+                <a:t>Lemma [</a:t>
               </a:r>
               <a:r>
                 <a:rPr lang="en-US" sz="2800" dirty="0" err="1"/>
@@ -8997,7 +8997,7 @@
               </a:r>
               <a:r>
                 <a:rPr lang="en-US" sz="2800" dirty="0"/>
-                <a:t>]: For any set of vectors                 there exist signs       </a:t>
+                <a:t>, L]: For any set of vectors                 there exist signs       </a:t>
               </a:r>
             </a:p>
             <a:p>
@@ -9564,6 +9564,36 @@
           <a:chExt cx="0" cy="0"/>
         </a:xfrm>
       </p:grpSpPr>
+      <p:pic>
+        <p:nvPicPr>
+          <p:cNvPr id="5" name="Picture 4">
+            <a:extLst>
+              <a:ext uri="{FF2B5EF4-FFF2-40B4-BE49-F238E27FC236}">
+                <a16:creationId xmlns:a16="http://schemas.microsoft.com/office/drawing/2014/main" id="{13827DAE-811F-7945-8F5B-56B50CBE4ADF}"/>
+              </a:ext>
+            </a:extLst>
+          </p:cNvPr>
+          <p:cNvPicPr>
+            <a:picLocks noChangeAspect="1"/>
+          </p:cNvPicPr>
+          <p:nvPr/>
+        </p:nvPicPr>
+        <p:blipFill>
+          <a:blip r:embed="rId3"/>
+          <a:stretch>
+            <a:fillRect/>
+          </a:stretch>
+        </p:blipFill>
+        <p:spPr>
+          <a:xfrm>
+            <a:off x="1648406" y="3721806"/>
+            <a:ext cx="8597900" cy="2425700"/>
+          </a:xfrm>
+          <a:prstGeom prst="rect">
+            <a:avLst/>
+          </a:prstGeom>
+        </p:spPr>
+      </p:pic>
       <p:sp>
         <p:nvSpPr>
           <p:cNvPr id="9" name="Title 8">
@@ -9654,36 +9684,6 @@
           </a:p>
         </p:txBody>
       </p:sp>
-      <p:pic>
-        <p:nvPicPr>
-          <p:cNvPr id="28" name="Picture 27">
-            <a:extLst>
-              <a:ext uri="{FF2B5EF4-FFF2-40B4-BE49-F238E27FC236}">
-                <a16:creationId xmlns:a16="http://schemas.microsoft.com/office/drawing/2014/main" id="{C0C84840-ECD1-3A49-8F9D-C40E8D2C7D7D}"/>
-              </a:ext>
-            </a:extLst>
-          </p:cNvPr>
-          <p:cNvPicPr>
-            <a:picLocks noChangeAspect="1"/>
-          </p:cNvPicPr>
-          <p:nvPr/>
-        </p:nvPicPr>
-        <p:blipFill>
-          <a:blip r:embed="rId3"/>
-          <a:stretch>
-            <a:fillRect/>
-          </a:stretch>
-        </p:blipFill>
-        <p:spPr>
-          <a:xfrm>
-            <a:off x="1655537" y="3675948"/>
-            <a:ext cx="7848600" cy="2425700"/>
-          </a:xfrm>
-          <a:prstGeom prst="rect">
-            <a:avLst/>
-          </a:prstGeom>
-        </p:spPr>
-      </p:pic>
       <p:sp>
         <p:nvSpPr>
           <p:cNvPr id="30" name="Right Brace 29">
@@ -9698,15 +9698,15 @@
         </p:nvSpPr>
         <p:spPr>
           <a:xfrm rot="5400000" flipH="1">
-            <a:off x="8372132" y="4269640"/>
-            <a:ext cx="333286" cy="1930724"/>
+            <a:off x="8922684" y="4129782"/>
+            <a:ext cx="333286" cy="2210439"/>
           </a:xfrm>
           <a:prstGeom prst="rightBrace">
             <a:avLst/>
           </a:prstGeom>
           <a:ln>
             <a:solidFill>
-              <a:srgbClr val="00B050"/>
+              <a:srgbClr val="01B150"/>
             </a:solidFill>
           </a:ln>
         </p:spPr>
@@ -9747,7 +9747,7 @@
         </p:nvSpPr>
         <p:spPr>
           <a:xfrm>
-            <a:off x="7618017" y="4575038"/>
+            <a:off x="8080471" y="4575038"/>
             <a:ext cx="3465629" cy="523220"/>
           </a:xfrm>
           <a:prstGeom prst="rect">
@@ -9819,8 +9819,8 @@
         </p:nvSpPr>
         <p:spPr>
           <a:xfrm>
-            <a:off x="7111199" y="2687789"/>
-            <a:ext cx="2461636" cy="523220"/>
+            <a:off x="7372454" y="2252358"/>
+            <a:ext cx="2616422" cy="523220"/>
           </a:xfrm>
           <a:prstGeom prst="rect">
             <a:avLst/>
@@ -9831,7 +9831,7 @@
           </a:ln>
         </p:spPr>
         <p:txBody>
-          <a:bodyPr wrap="none" rtlCol="0">
+          <a:bodyPr wrap="square" rtlCol="0">
             <a:spAutoFit/>
           </a:bodyPr>
           <a:lstStyle/>
@@ -9842,7 +9842,7 @@
                   <a:srgbClr val="00B050"/>
                 </a:solidFill>
               </a:rPr>
-              <a:t>Tylor expansion</a:t>
+              <a:t>Taylor expansion</a:t>
             </a:r>
           </a:p>
         </p:txBody>
@@ -9857,14 +9857,14 @@
             </a:extLst>
           </p:cNvPr>
           <p:cNvCxnSpPr>
+            <a:cxnSpLocks/>
             <a:stCxn id="16" idx="1"/>
-            <a:endCxn id="28" idx="0"/>
           </p:cNvCxnSpPr>
           <p:nvPr/>
         </p:nvCxnSpPr>
         <p:spPr>
           <a:xfrm rot="10800000" flipV="1">
-            <a:off x="5579837" y="2949398"/>
+            <a:off x="5841092" y="2513967"/>
             <a:ext cx="1531362" cy="726549"/>
           </a:xfrm>
           <a:prstGeom prst="curvedConnector2">
@@ -9872,7 +9872,7 @@
           </a:prstGeom>
           <a:ln>
             <a:solidFill>
-              <a:schemeClr val="accent6"/>
+              <a:srgbClr val="01B150"/>
             </a:solidFill>
             <a:tailEnd type="triangle"/>
           </a:ln>
@@ -9892,6 +9892,55 @@
           </a:fontRef>
         </p:style>
       </p:cxnSp>
+      <p:sp>
+        <p:nvSpPr>
+          <p:cNvPr id="19" name="Right Brace 18">
+            <a:extLst>
+              <a:ext uri="{FF2B5EF4-FFF2-40B4-BE49-F238E27FC236}">
+                <a16:creationId xmlns:a16="http://schemas.microsoft.com/office/drawing/2014/main" id="{1AD2791F-5670-B143-95EC-70FE8C55D0D2}"/>
+              </a:ext>
+            </a:extLst>
+          </p:cNvPr>
+          <p:cNvSpPr/>
+          <p:nvPr/>
+        </p:nvSpPr>
+        <p:spPr>
+          <a:xfrm rot="5400000" flipH="1">
+            <a:off x="5672822" y="2565255"/>
+            <a:ext cx="333286" cy="1877411"/>
+          </a:xfrm>
+          <a:prstGeom prst="rightBrace">
+            <a:avLst/>
+          </a:prstGeom>
+          <a:ln>
+            <a:solidFill>
+              <a:srgbClr val="01B150"/>
+            </a:solidFill>
+          </a:ln>
+        </p:spPr>
+        <p:style>
+          <a:lnRef idx="1">
+            <a:schemeClr val="accent1"/>
+          </a:lnRef>
+          <a:fillRef idx="0">
+            <a:schemeClr val="accent1"/>
+          </a:fillRef>
+          <a:effectRef idx="0">
+            <a:schemeClr val="accent1"/>
+          </a:effectRef>
+          <a:fontRef idx="minor">
+            <a:schemeClr val="tx1"/>
+          </a:fontRef>
+        </p:style>
+        <p:txBody>
+          <a:bodyPr rtlCol="0" anchor="ctr"/>
+          <a:lstStyle/>
+          <a:p>
+            <a:pPr algn="ctr"/>
+            <a:endParaRPr lang="en-US" dirty="0"/>
+          </a:p>
+        </p:txBody>
+      </p:sp>
     </p:spTree>
     <p:extLst>
       <p:ext uri="{BB962C8B-B14F-4D97-AF65-F5344CB8AC3E}">
@@ -11628,6 +11677,126 @@
       </p:grpSpPr>
       <p:sp>
         <p:nvSpPr>
+          <p:cNvPr id="17" name="TextBox 16">
+            <a:extLst>
+              <a:ext uri="{FF2B5EF4-FFF2-40B4-BE49-F238E27FC236}">
+                <a16:creationId xmlns:a16="http://schemas.microsoft.com/office/drawing/2014/main" id="{DFE9D5CB-79D8-5C4F-9FC7-2EA5BB0CBD71}"/>
+              </a:ext>
+            </a:extLst>
+          </p:cNvPr>
+          <p:cNvSpPr txBox="1"/>
+          <p:nvPr/>
+        </p:nvSpPr>
+        <p:spPr>
+          <a:xfrm>
+            <a:off x="7679582" y="397484"/>
+            <a:ext cx="4152099" cy="954107"/>
+          </a:xfrm>
+          <a:prstGeom prst="rect">
+            <a:avLst/>
+          </a:prstGeom>
+          <a:solidFill>
+            <a:schemeClr val="accent4">
+              <a:lumMod val="40000"/>
+              <a:lumOff val="60000"/>
+            </a:schemeClr>
+          </a:solidFill>
+        </p:spPr>
+        <p:txBody>
+          <a:bodyPr wrap="none" rtlCol="0">
+            <a:spAutoFit/>
+          </a:bodyPr>
+          <a:lstStyle/>
+          <a:p>
+            <a:r>
+              <a:rPr lang="en-US" sz="2800" dirty="0"/>
+              <a:t>Resolves the open problem</a:t>
+            </a:r>
+          </a:p>
+          <a:p>
+            <a:r>
+              <a:rPr lang="en-US" sz="2800" dirty="0"/>
+              <a:t>See Philips an Tai 2018</a:t>
+            </a:r>
+          </a:p>
+        </p:txBody>
+      </p:sp>
+      <p:sp>
+        <p:nvSpPr>
+          <p:cNvPr id="18" name="TextBox 17">
+            <a:extLst>
+              <a:ext uri="{FF2B5EF4-FFF2-40B4-BE49-F238E27FC236}">
+                <a16:creationId xmlns:a16="http://schemas.microsoft.com/office/drawing/2014/main" id="{7223DCF0-05B0-AC4D-A58D-205896BD1374}"/>
+              </a:ext>
+            </a:extLst>
+          </p:cNvPr>
+          <p:cNvSpPr txBox="1"/>
+          <p:nvPr/>
+        </p:nvSpPr>
+        <p:spPr>
+          <a:xfrm>
+            <a:off x="1121977" y="2554120"/>
+            <a:ext cx="5244317" cy="725099"/>
+          </a:xfrm>
+          <a:prstGeom prst="rect">
+            <a:avLst/>
+          </a:prstGeom>
+          <a:solidFill>
+            <a:schemeClr val="accent4">
+              <a:lumMod val="40000"/>
+              <a:lumOff val="60000"/>
+            </a:schemeClr>
+          </a:solidFill>
+        </p:spPr>
+        <p:txBody>
+          <a:bodyPr wrap="square" rtlCol="0">
+            <a:spAutoFit/>
+          </a:bodyPr>
+          <a:lstStyle/>
+          <a:p>
+            <a:endParaRPr lang="en-US" dirty="0"/>
+          </a:p>
+        </p:txBody>
+      </p:sp>
+      <p:sp>
+        <p:nvSpPr>
+          <p:cNvPr id="19" name="TextBox 18">
+            <a:extLst>
+              <a:ext uri="{FF2B5EF4-FFF2-40B4-BE49-F238E27FC236}">
+                <a16:creationId xmlns:a16="http://schemas.microsoft.com/office/drawing/2014/main" id="{B24B6C63-A514-F143-AAE8-DAE30635311E}"/>
+              </a:ext>
+            </a:extLst>
+          </p:cNvPr>
+          <p:cNvSpPr txBox="1"/>
+          <p:nvPr/>
+        </p:nvSpPr>
+        <p:spPr>
+          <a:xfrm>
+            <a:off x="1311890" y="4518604"/>
+            <a:ext cx="3967478" cy="725099"/>
+          </a:xfrm>
+          <a:prstGeom prst="rect">
+            <a:avLst/>
+          </a:prstGeom>
+          <a:solidFill>
+            <a:schemeClr val="accent4">
+              <a:lumMod val="40000"/>
+              <a:lumOff val="60000"/>
+            </a:schemeClr>
+          </a:solidFill>
+        </p:spPr>
+        <p:txBody>
+          <a:bodyPr wrap="square" rtlCol="0">
+            <a:spAutoFit/>
+          </a:bodyPr>
+          <a:lstStyle/>
+          <a:p>
+            <a:endParaRPr lang="en-US" dirty="0"/>
+          </a:p>
+        </p:txBody>
+      </p:sp>
+      <p:sp>
+        <p:nvSpPr>
           <p:cNvPr id="2" name="Title 1">
             <a:extLst>
               <a:ext uri="{FF2B5EF4-FFF2-40B4-BE49-F238E27FC236}">
@@ -11654,6 +11823,126 @@
           </a:p>
         </p:txBody>
       </p:sp>
+      <p:pic>
+        <p:nvPicPr>
+          <p:cNvPr id="4" name="Picture 3">
+            <a:extLst>
+              <a:ext uri="{FF2B5EF4-FFF2-40B4-BE49-F238E27FC236}">
+                <a16:creationId xmlns:a16="http://schemas.microsoft.com/office/drawing/2014/main" id="{4F16A3F3-AD7C-D340-B89A-94007DF8F4A4}"/>
+              </a:ext>
+            </a:extLst>
+          </p:cNvPr>
+          <p:cNvPicPr>
+            <a:picLocks noChangeAspect="1"/>
+          </p:cNvPicPr>
+          <p:nvPr/>
+        </p:nvPicPr>
+        <p:blipFill>
+          <a:blip r:embed="rId2"/>
+          <a:stretch>
+            <a:fillRect/>
+          </a:stretch>
+        </p:blipFill>
+        <p:spPr>
+          <a:xfrm>
+            <a:off x="3865036" y="4710217"/>
+            <a:ext cx="1114872" cy="359636"/>
+          </a:xfrm>
+          <a:prstGeom prst="rect">
+            <a:avLst/>
+          </a:prstGeom>
+        </p:spPr>
+      </p:pic>
+      <p:pic>
+        <p:nvPicPr>
+          <p:cNvPr id="14" name="Picture 13">
+            <a:extLst>
+              <a:ext uri="{FF2B5EF4-FFF2-40B4-BE49-F238E27FC236}">
+                <a16:creationId xmlns:a16="http://schemas.microsoft.com/office/drawing/2014/main" id="{673E78E5-4F09-6A40-9726-E2E04A935196}"/>
+              </a:ext>
+            </a:extLst>
+          </p:cNvPr>
+          <p:cNvPicPr>
+            <a:picLocks noChangeAspect="1"/>
+          </p:cNvPicPr>
+          <p:nvPr/>
+        </p:nvPicPr>
+        <p:blipFill>
+          <a:blip r:embed="rId3"/>
+          <a:stretch>
+            <a:fillRect/>
+          </a:stretch>
+        </p:blipFill>
+        <p:spPr>
+          <a:xfrm>
+            <a:off x="5559261" y="5069853"/>
+            <a:ext cx="3479800" cy="571500"/>
+          </a:xfrm>
+          <a:prstGeom prst="rect">
+            <a:avLst/>
+          </a:prstGeom>
+        </p:spPr>
+      </p:pic>
+      <p:pic>
+        <p:nvPicPr>
+          <p:cNvPr id="15" name="Picture 14">
+            <a:extLst>
+              <a:ext uri="{FF2B5EF4-FFF2-40B4-BE49-F238E27FC236}">
+                <a16:creationId xmlns:a16="http://schemas.microsoft.com/office/drawing/2014/main" id="{98C04F29-2B9C-8B49-AA3D-22B136F80831}"/>
+              </a:ext>
+            </a:extLst>
+          </p:cNvPr>
+          <p:cNvPicPr>
+            <a:picLocks noChangeAspect="1"/>
+          </p:cNvPicPr>
+          <p:nvPr/>
+        </p:nvPicPr>
+        <p:blipFill>
+          <a:blip r:embed="rId4"/>
+          <a:stretch>
+            <a:fillRect/>
+          </a:stretch>
+        </p:blipFill>
+        <p:spPr>
+          <a:xfrm>
+            <a:off x="7433235" y="5641353"/>
+            <a:ext cx="3708400" cy="571500"/>
+          </a:xfrm>
+          <a:prstGeom prst="rect">
+            <a:avLst/>
+          </a:prstGeom>
+        </p:spPr>
+      </p:pic>
+      <p:pic>
+        <p:nvPicPr>
+          <p:cNvPr id="16" name="Picture 15">
+            <a:extLst>
+              <a:ext uri="{FF2B5EF4-FFF2-40B4-BE49-F238E27FC236}">
+                <a16:creationId xmlns:a16="http://schemas.microsoft.com/office/drawing/2014/main" id="{E5053D54-1145-854E-A151-40AA0720506D}"/>
+              </a:ext>
+            </a:extLst>
+          </p:cNvPr>
+          <p:cNvPicPr>
+            <a:picLocks noChangeAspect="1"/>
+          </p:cNvPicPr>
+          <p:nvPr/>
+        </p:nvPicPr>
+        <p:blipFill>
+          <a:blip r:embed="rId5"/>
+          <a:stretch>
+            <a:fillRect/>
+          </a:stretch>
+        </p:blipFill>
+        <p:spPr>
+          <a:xfrm>
+            <a:off x="7520432" y="3671821"/>
+            <a:ext cx="2235200" cy="381000"/>
+          </a:xfrm>
+          <a:prstGeom prst="rect">
+            <a:avLst/>
+          </a:prstGeom>
+        </p:spPr>
+      </p:pic>
       <p:sp>
         <p:nvSpPr>
           <p:cNvPr id="3" name="Content Placeholder 2">
@@ -11672,7 +11961,7 @@
         </p:nvSpPr>
         <p:spPr>
           <a:xfrm>
-            <a:off x="838200" y="1624149"/>
+            <a:off x="838200" y="1606897"/>
             <a:ext cx="10515600" cy="5722051"/>
           </a:xfrm>
         </p:spPr>
@@ -11697,17 +11986,6 @@
             <a:r>
               <a:rPr lang="en-US" dirty="0"/>
               <a:t>Gaussian Kernel Density estimation  </a:t>
-            </a:r>
-          </a:p>
-          <a:p>
-            <a:pPr lvl="1"/>
-            <a:r>
-              <a:rPr lang="en-US" dirty="0"/>
-              <a:t>Improving on result by Philips an Tai and </a:t>
-            </a:r>
-            <a:r>
-              <a:rPr lang="en-US" b="1" dirty="0"/>
-              <a:t>resolving the open problem</a:t>
             </a:r>
           </a:p>
           <a:p>
@@ -11764,126 +12042,6 @@
           </a:p>
         </p:txBody>
       </p:sp>
-      <p:pic>
-        <p:nvPicPr>
-          <p:cNvPr id="4" name="Picture 3">
-            <a:extLst>
-              <a:ext uri="{FF2B5EF4-FFF2-40B4-BE49-F238E27FC236}">
-                <a16:creationId xmlns:a16="http://schemas.microsoft.com/office/drawing/2014/main" id="{4F16A3F3-AD7C-D340-B89A-94007DF8F4A4}"/>
-              </a:ext>
-            </a:extLst>
-          </p:cNvPr>
-          <p:cNvPicPr>
-            <a:picLocks noChangeAspect="1"/>
-          </p:cNvPicPr>
-          <p:nvPr/>
-        </p:nvPicPr>
-        <p:blipFill>
-          <a:blip r:embed="rId2"/>
-          <a:stretch>
-            <a:fillRect/>
-          </a:stretch>
-        </p:blipFill>
-        <p:spPr>
-          <a:xfrm>
-            <a:off x="3865036" y="5124286"/>
-            <a:ext cx="1114872" cy="359636"/>
-          </a:xfrm>
-          <a:prstGeom prst="rect">
-            <a:avLst/>
-          </a:prstGeom>
-        </p:spPr>
-      </p:pic>
-      <p:pic>
-        <p:nvPicPr>
-          <p:cNvPr id="14" name="Picture 13">
-            <a:extLst>
-              <a:ext uri="{FF2B5EF4-FFF2-40B4-BE49-F238E27FC236}">
-                <a16:creationId xmlns:a16="http://schemas.microsoft.com/office/drawing/2014/main" id="{673E78E5-4F09-6A40-9726-E2E04A935196}"/>
-              </a:ext>
-            </a:extLst>
-          </p:cNvPr>
-          <p:cNvPicPr>
-            <a:picLocks noChangeAspect="1"/>
-          </p:cNvPicPr>
-          <p:nvPr/>
-        </p:nvPicPr>
-        <p:blipFill>
-          <a:blip r:embed="rId3"/>
-          <a:stretch>
-            <a:fillRect/>
-          </a:stretch>
-        </p:blipFill>
-        <p:spPr>
-          <a:xfrm>
-            <a:off x="5559261" y="5483922"/>
-            <a:ext cx="3479800" cy="571500"/>
-          </a:xfrm>
-          <a:prstGeom prst="rect">
-            <a:avLst/>
-          </a:prstGeom>
-        </p:spPr>
-      </p:pic>
-      <p:pic>
-        <p:nvPicPr>
-          <p:cNvPr id="15" name="Picture 14">
-            <a:extLst>
-              <a:ext uri="{FF2B5EF4-FFF2-40B4-BE49-F238E27FC236}">
-                <a16:creationId xmlns:a16="http://schemas.microsoft.com/office/drawing/2014/main" id="{98C04F29-2B9C-8B49-AA3D-22B136F80831}"/>
-              </a:ext>
-            </a:extLst>
-          </p:cNvPr>
-          <p:cNvPicPr>
-            <a:picLocks noChangeAspect="1"/>
-          </p:cNvPicPr>
-          <p:nvPr/>
-        </p:nvPicPr>
-        <p:blipFill>
-          <a:blip r:embed="rId4"/>
-          <a:stretch>
-            <a:fillRect/>
-          </a:stretch>
-        </p:blipFill>
-        <p:spPr>
-          <a:xfrm>
-            <a:off x="7433235" y="6055422"/>
-            <a:ext cx="3708400" cy="571500"/>
-          </a:xfrm>
-          <a:prstGeom prst="rect">
-            <a:avLst/>
-          </a:prstGeom>
-        </p:spPr>
-      </p:pic>
-      <p:pic>
-        <p:nvPicPr>
-          <p:cNvPr id="16" name="Picture 15">
-            <a:extLst>
-              <a:ext uri="{FF2B5EF4-FFF2-40B4-BE49-F238E27FC236}">
-                <a16:creationId xmlns:a16="http://schemas.microsoft.com/office/drawing/2014/main" id="{E5053D54-1145-854E-A151-40AA0720506D}"/>
-              </a:ext>
-            </a:extLst>
-          </p:cNvPr>
-          <p:cNvPicPr>
-            <a:picLocks noChangeAspect="1"/>
-          </p:cNvPicPr>
-          <p:nvPr/>
-        </p:nvPicPr>
-        <p:blipFill>
-          <a:blip r:embed="rId5"/>
-          <a:stretch>
-            <a:fillRect/>
-          </a:stretch>
-        </p:blipFill>
-        <p:spPr>
-          <a:xfrm>
-            <a:off x="7520432" y="4085886"/>
-            <a:ext cx="2235200" cy="381000"/>
-          </a:xfrm>
-          <a:prstGeom prst="rect">
-            <a:avLst/>
-          </a:prstGeom>
-        </p:spPr>
-      </p:pic>
     </p:spTree>
     <p:extLst>
       <p:ext uri="{BB962C8B-B14F-4D97-AF65-F5344CB8AC3E}">
@@ -11894,6 +12052,140 @@
   <p:clrMapOvr>
     <a:masterClrMapping/>
   </p:clrMapOvr>
+  <p:timing>
+    <p:tnLst>
+      <p:par>
+        <p:cTn id="1" dur="indefinite" restart="never" nodeType="tmRoot">
+          <p:childTnLst>
+            <p:seq concurrent="1" nextAc="seek">
+              <p:cTn id="2" dur="indefinite" nodeType="mainSeq">
+                <p:childTnLst>
+                  <p:par>
+                    <p:cTn id="3" fill="hold">
+                      <p:stCondLst>
+                        <p:cond delay="indefinite"/>
+                      </p:stCondLst>
+                      <p:childTnLst>
+                        <p:par>
+                          <p:cTn id="4" fill="hold">
+                            <p:stCondLst>
+                              <p:cond delay="0"/>
+                            </p:stCondLst>
+                            <p:childTnLst>
+                              <p:par>
+                                <p:cTn id="5" presetID="1" presetClass="entr" presetSubtype="0" fill="hold" grpId="0" nodeType="clickEffect">
+                                  <p:stCondLst>
+                                    <p:cond delay="0"/>
+                                  </p:stCondLst>
+                                  <p:childTnLst>
+                                    <p:set>
+                                      <p:cBhvr>
+                                        <p:cTn id="6" dur="1" fill="hold">
+                                          <p:stCondLst>
+                                            <p:cond delay="0"/>
+                                          </p:stCondLst>
+                                        </p:cTn>
+                                        <p:tgtEl>
+                                          <p:spTgt spid="19"/>
+                                        </p:tgtEl>
+                                        <p:attrNameLst>
+                                          <p:attrName>style.visibility</p:attrName>
+                                        </p:attrNameLst>
+                                      </p:cBhvr>
+                                      <p:to>
+                                        <p:strVal val="visible"/>
+                                      </p:to>
+                                    </p:set>
+                                  </p:childTnLst>
+                                </p:cTn>
+                              </p:par>
+                              <p:par>
+                                <p:cTn id="7" presetID="1" presetClass="entr" presetSubtype="0" fill="hold" grpId="0" nodeType="withEffect">
+                                  <p:stCondLst>
+                                    <p:cond delay="0"/>
+                                  </p:stCondLst>
+                                  <p:childTnLst>
+                                    <p:set>
+                                      <p:cBhvr>
+                                        <p:cTn id="8" dur="1" fill="hold">
+                                          <p:stCondLst>
+                                            <p:cond delay="0"/>
+                                          </p:stCondLst>
+                                        </p:cTn>
+                                        <p:tgtEl>
+                                          <p:spTgt spid="18"/>
+                                        </p:tgtEl>
+                                        <p:attrNameLst>
+                                          <p:attrName>style.visibility</p:attrName>
+                                        </p:attrNameLst>
+                                      </p:cBhvr>
+                                      <p:to>
+                                        <p:strVal val="visible"/>
+                                      </p:to>
+                                    </p:set>
+                                  </p:childTnLst>
+                                </p:cTn>
+                              </p:par>
+                              <p:par>
+                                <p:cTn id="9" presetID="1" presetClass="entr" presetSubtype="0" fill="hold" grpId="0" nodeType="withEffect">
+                                  <p:stCondLst>
+                                    <p:cond delay="0"/>
+                                  </p:stCondLst>
+                                  <p:childTnLst>
+                                    <p:set>
+                                      <p:cBhvr>
+                                        <p:cTn id="10" dur="1" fill="hold">
+                                          <p:stCondLst>
+                                            <p:cond delay="0"/>
+                                          </p:stCondLst>
+                                        </p:cTn>
+                                        <p:tgtEl>
+                                          <p:spTgt spid="17"/>
+                                        </p:tgtEl>
+                                        <p:attrNameLst>
+                                          <p:attrName>style.visibility</p:attrName>
+                                        </p:attrNameLst>
+                                      </p:cBhvr>
+                                      <p:to>
+                                        <p:strVal val="visible"/>
+                                      </p:to>
+                                    </p:set>
+                                  </p:childTnLst>
+                                </p:cTn>
+                              </p:par>
+                            </p:childTnLst>
+                          </p:cTn>
+                        </p:par>
+                      </p:childTnLst>
+                    </p:cTn>
+                  </p:par>
+                </p:childTnLst>
+              </p:cTn>
+              <p:prevCondLst>
+                <p:cond evt="onPrev" delay="0">
+                  <p:tgtEl>
+                    <p:sldTgt/>
+                  </p:tgtEl>
+                </p:cond>
+              </p:prevCondLst>
+              <p:nextCondLst>
+                <p:cond evt="onNext" delay="0">
+                  <p:tgtEl>
+                    <p:sldTgt/>
+                  </p:tgtEl>
+                </p:cond>
+              </p:nextCondLst>
+            </p:seq>
+          </p:childTnLst>
+        </p:cTn>
+      </p:par>
+    </p:tnLst>
+    <p:bldLst>
+      <p:bldP spid="17" grpId="0" animBg="1"/>
+      <p:bldP spid="18" grpId="0" animBg="1"/>
+      <p:bldP spid="19" grpId="0" animBg="1"/>
+    </p:bldLst>
+  </p:timing>
 </p:sld>
 </file>
 
@@ -12819,8 +13111,8 @@
         </p:nvSpPr>
         <p:spPr>
           <a:xfrm>
-            <a:off x="838200" y="1447800"/>
-            <a:ext cx="10515600" cy="5048250"/>
+            <a:off x="416689" y="1447800"/>
+            <a:ext cx="11418753" cy="5048250"/>
           </a:xfrm>
         </p:spPr>
         <p:txBody>
@@ -12855,7 +13147,7 @@
             </a:r>
             <a:r>
               <a:rPr lang="en-US" sz="1200" dirty="0"/>
-              <a:t>. Geometric approximation via coresets. </a:t>
+              <a:t>.  Geometric approximation via coresets. </a:t>
             </a:r>
             <a:r>
               <a:rPr lang="en-US" sz="1200" i="1" dirty="0"/>
@@ -12891,23 +13183,7 @@
             </a:br>
             <a:r>
               <a:rPr lang="en-US" sz="1200" dirty="0"/>
-              <a:t>Jeff M. Phillips and Wai Ming Tai. Improved coresets for kernel density estimates. In </a:t>
-            </a:r>
-            <a:r>
-              <a:rPr lang="en-US" sz="1200" dirty="0" err="1"/>
-              <a:t>Ar</a:t>
-            </a:r>
-            <a:r>
-              <a:rPr lang="en-US" sz="1200" dirty="0"/>
-              <a:t>- tur </a:t>
-            </a:r>
-            <a:r>
-              <a:rPr lang="en-US" sz="1200" dirty="0" err="1"/>
-              <a:t>Czumaj</a:t>
-            </a:r>
-            <a:r>
-              <a:rPr lang="en-US" sz="1200" dirty="0"/>
-              <a:t>, editor, </a:t>
+              <a:t>Jeff M. Phillips and Wai Ming Tai.  Improved coresets for kernel density estimates. </a:t>
             </a:r>
             <a:r>
               <a:rPr lang="en-US" sz="1200" i="1" dirty="0"/>
@@ -12929,23 +13205,7 @@
             </a:br>
             <a:r>
               <a:rPr lang="en-US" sz="1200" dirty="0"/>
-              <a:t>Dan Feldman and Michael Langberg. A unified framework for approximating and clustering data. In </a:t>
-            </a:r>
-            <a:r>
-              <a:rPr lang="en-US" sz="1200" dirty="0" err="1"/>
-              <a:t>Fortnow</a:t>
-            </a:r>
-            <a:r>
-              <a:rPr lang="en-US" sz="1200" dirty="0"/>
-              <a:t> and </a:t>
-            </a:r>
-            <a:r>
-              <a:rPr lang="en-US" sz="1200" dirty="0" err="1"/>
-              <a:t>Vadhan</a:t>
-            </a:r>
-            <a:r>
-              <a:rPr lang="en-US" sz="1200" dirty="0"/>
-              <a:t> (2011), pages 569–578 </a:t>
+              <a:t>Dan Feldman and Michael Langberg.  A unified framework for approximating and clustering data. 2011</a:t>
             </a:r>
             <a:br>
               <a:rPr lang="en-US" sz="1200" dirty="0"/>
@@ -12955,8 +13215,11 @@
             </a:br>
             <a:r>
               <a:rPr lang="en-US" sz="1200" dirty="0"/>
-              <a:t>Jeff M. Phillips and Wai Ming Tai. Near-optimal coresets of kernel density estimates </a:t>
+              <a:t>Jeff M. Phillips and Wai Ming Tai.  Near-optimal coresets of kernel density estimates </a:t>
             </a:r>
+            <a:br>
+              <a:rPr lang="en-US" sz="1200" dirty="0"/>
+            </a:br>
             <a:br>
               <a:rPr lang="en-US" sz="1200" dirty="0"/>
             </a:br>
@@ -12974,14 +13237,7 @@
             </a:r>
             <a:r>
               <a:rPr lang="en-US" sz="1200" dirty="0"/>
-              <a:t> and Dan Feldman. Coresets for monotonic functions with applications to deep </a:t>
-            </a:r>
-            <a:br>
-              <a:rPr lang="en-US" sz="1200" dirty="0"/>
-            </a:br>
-            <a:r>
-              <a:rPr lang="en-US" sz="1200" dirty="0"/>
-              <a:t>learning.</a:t>
+              <a:t> and Dan Feldman.  Coresets for monotonic functions with applications to deep  learning.</a:t>
             </a:r>
             <a:br>
               <a:rPr lang="en-US" sz="1200" dirty="0"/>
@@ -13019,7 +13275,7 @@
             </a:r>
             <a:r>
               <a:rPr lang="en-US" sz="1200" dirty="0"/>
-              <a:t>. Maximum margin coresets for active and noise tolerant learning. In Manuela M. Veloso, editor, </a:t>
+              <a:t>.  Maximum margin coresets for active and noise tolerant learning. </a:t>
             </a:r>
             <a:r>
               <a:rPr lang="en-US" sz="1200" i="1" dirty="0"/>
@@ -13045,23 +13301,11 @@
             </a:r>
             <a:r>
               <a:rPr lang="en-US" sz="1200" dirty="0"/>
-              <a:t> and Akash Kushal. Smaller coresets for k-median and k-means clustering. In JosephS.B.MitchellandGunterRote,editors,</a:t>
+              <a:t> and Akash Kushal.  Smaller coresets for k-median and k-means clustering. T</a:t>
             </a:r>
             <a:r>
               <a:rPr lang="en-US" sz="1200" i="1" dirty="0"/>
-              <a:t>Proceedingsofthe21stACMSymposiumonCom- </a:t>
-            </a:r>
-            <a:r>
-              <a:rPr lang="en-US" sz="1200" i="1" dirty="0" err="1"/>
-              <a:t>putational</a:t>
-            </a:r>
-            <a:r>
-              <a:rPr lang="en-US" sz="1200" i="1" dirty="0"/>
-              <a:t> Geometry, Pisa, Italy, June 6-8, 2005</a:t>
-            </a:r>
-            <a:r>
-              <a:rPr lang="en-US" sz="1200" dirty="0"/>
-              <a:t>, pages 126–134 </a:t>
+              <a:t>he21st ACM Symposium on Computational Geometry, Pisa, Italy, June 6-8, 2005</a:t>
             </a:r>
             <a:br>
               <a:rPr lang="en-US" sz="1200" dirty="0"/>
@@ -13079,7 +13323,7 @@
             </a:r>
             <a:r>
               <a:rPr lang="en-US" sz="1200" dirty="0"/>
-              <a:t>, Sridhar Rajagopalan, and Bruce G. Lindsay. Random sampling techniques for space efficient online computation of order statistics of large datasets. </a:t>
+              <a:t>, Sridhar Rajagopalan, and Bruce G. Lindsay.  Random sampling techniques for space efficient online computation of order statistics of large datasets. </a:t>
             </a:r>
             <a:br>
               <a:rPr lang="en-US" sz="1200" dirty="0"/>
@@ -13113,7 +13357,7 @@
             </a:r>
             <a:r>
               <a:rPr lang="en-US" sz="1200" dirty="0"/>
-              <a:t>, and David P. Woodruff. On coresets for logistic regression. </a:t>
+              <a:t>, and David P. Woodruff.  On coresets for logistic regression. </a:t>
             </a:r>
             <a:br>
               <a:rPr lang="en-US" sz="1200" dirty="0"/>
@@ -13131,23 +13375,7 @@
             </a:r>
             <a:r>
               <a:rPr lang="en-US" sz="1200" dirty="0"/>
-              <a:t>, Kevin J. Lang, and Edo Liberty. Optimal quantile approximation in streams. In </a:t>
-            </a:r>
-            <a:r>
-              <a:rPr lang="en-US" sz="1200" dirty="0" err="1"/>
-              <a:t>Irit</a:t>
-            </a:r>
-            <a:r>
-              <a:rPr lang="en-US" sz="1200" dirty="0"/>
-              <a:t> </a:t>
-            </a:r>
-            <a:r>
-              <a:rPr lang="en-US" sz="1200" dirty="0" err="1"/>
-              <a:t>Dinur</a:t>
-            </a:r>
-            <a:r>
-              <a:rPr lang="en-US" sz="1200" dirty="0"/>
-              <a:t>, editor, </a:t>
+              <a:t>, Kevin J. Lang, and Edo Liberty.  Optimal quantile approximation in streams. </a:t>
             </a:r>
             <a:r>
               <a:rPr lang="en-US" sz="1200" i="1" dirty="0"/>
@@ -13179,6 +13407,9 @@
               <a:rPr lang="en-US" sz="1200" dirty="0"/>
               <a:t>, 3:463–482, March 2003 </a:t>
             </a:r>
+            <a:br>
+              <a:rPr lang="en-US" sz="1200" dirty="0"/>
+            </a:br>
             <a:br>
               <a:rPr lang="en-US" sz="1200" dirty="0"/>
             </a:br>
@@ -13222,15 +13453,7 @@
             </a:r>
             <a:r>
               <a:rPr lang="en-US" sz="1200" dirty="0"/>
-              <a:t>. Balancing vectors and gaussian measures of n-dimensional convex bod- </a:t>
-            </a:r>
-            <a:r>
-              <a:rPr lang="en-US" sz="1200" dirty="0" err="1"/>
-              <a:t>ies</a:t>
-            </a:r>
-            <a:r>
-              <a:rPr lang="en-US" sz="1200" dirty="0"/>
-              <a:t>. </a:t>
+              <a:t>. Balancing vectors and gaussian measures of n-dimensional convex bodies. </a:t>
             </a:r>
             <a:r>
               <a:rPr lang="en-US" sz="1200" i="1" dirty="0"/>
@@ -15327,170 +15550,300 @@
           <a:chExt cx="0" cy="0"/>
         </a:xfrm>
       </p:grpSpPr>
-      <p:sp>
-        <p:nvSpPr>
-          <p:cNvPr id="8" name="Oval 7">
-            <a:extLst>
-              <a:ext uri="{FF2B5EF4-FFF2-40B4-BE49-F238E27FC236}">
-                <a16:creationId xmlns:a16="http://schemas.microsoft.com/office/drawing/2014/main" id="{8C0BB476-4275-2048-AF81-6398B3822C4E}"/>
-              </a:ext>
-            </a:extLst>
-          </p:cNvPr>
-          <p:cNvSpPr/>
-          <p:nvPr/>
-        </p:nvSpPr>
-        <p:spPr>
-          <a:xfrm rot="10800000">
-            <a:off x="946074" y="1434974"/>
+      <p:grpSp>
+        <p:nvGrpSpPr>
+          <p:cNvPr id="52" name="Group 51">
+            <a:extLst>
+              <a:ext uri="{FF2B5EF4-FFF2-40B4-BE49-F238E27FC236}">
+                <a16:creationId xmlns:a16="http://schemas.microsoft.com/office/drawing/2014/main" id="{79BA66F3-1BCF-6440-BE8B-15F99AE93B2D}"/>
+              </a:ext>
+            </a:extLst>
+          </p:cNvPr>
+          <p:cNvGrpSpPr/>
+          <p:nvPr/>
+        </p:nvGrpSpPr>
+        <p:grpSpPr>
+          <a:xfrm>
+            <a:off x="7145156" y="1464117"/>
             <a:ext cx="4572000" cy="4572000"/>
-          </a:xfrm>
-          <a:prstGeom prst="ellipse">
-            <a:avLst/>
-          </a:prstGeom>
-          <a:gradFill flip="none" rotWithShape="1">
-            <a:gsLst>
-              <a:gs pos="0">
-                <a:schemeClr val="accent1">
-                  <a:lumMod val="5000"/>
-                  <a:lumOff val="95000"/>
-                  <a:alpha val="0"/>
-                </a:schemeClr>
-              </a:gs>
-              <a:gs pos="76000">
-                <a:schemeClr val="accent1">
-                  <a:lumMod val="45000"/>
-                  <a:lumOff val="55000"/>
-                </a:schemeClr>
-              </a:gs>
-              <a:gs pos="42000">
-                <a:schemeClr val="accent1">
-                  <a:lumMod val="0"/>
-                  <a:lumOff val="100000"/>
-                  <a:alpha val="71000"/>
-                </a:schemeClr>
-              </a:gs>
-              <a:gs pos="57000">
-                <a:schemeClr val="accent1">
-                  <a:lumMod val="30000"/>
-                  <a:lumOff val="70000"/>
-                  <a:alpha val="56000"/>
-                </a:schemeClr>
-              </a:gs>
-            </a:gsLst>
-            <a:lin ang="0" scaled="1"/>
-            <a:tileRect/>
-          </a:gradFill>
-          <a:ln>
-            <a:noFill/>
-          </a:ln>
-        </p:spPr>
-        <p:style>
-          <a:lnRef idx="2">
-            <a:schemeClr val="accent1">
-              <a:shade val="50000"/>
-            </a:schemeClr>
-          </a:lnRef>
-          <a:fillRef idx="1">
-            <a:schemeClr val="accent1"/>
-          </a:fillRef>
-          <a:effectRef idx="0">
-            <a:schemeClr val="accent1"/>
-          </a:effectRef>
-          <a:fontRef idx="minor">
-            <a:schemeClr val="lt1"/>
-          </a:fontRef>
-        </p:style>
-        <p:txBody>
-          <a:bodyPr rtlCol="0" anchor="ctr"/>
-          <a:lstStyle/>
-          <a:p>
-            <a:pPr algn="ctr"/>
-            <a:endParaRPr lang="en-US"/>
-          </a:p>
-        </p:txBody>
-      </p:sp>
-      <p:sp>
-        <p:nvSpPr>
-          <p:cNvPr id="38" name="Oval 37">
-            <a:extLst>
-              <a:ext uri="{FF2B5EF4-FFF2-40B4-BE49-F238E27FC236}">
-                <a16:creationId xmlns:a16="http://schemas.microsoft.com/office/drawing/2014/main" id="{B57E1502-E599-3746-924B-966A2E1CCDC2}"/>
-              </a:ext>
-            </a:extLst>
-          </p:cNvPr>
-          <p:cNvSpPr/>
-          <p:nvPr/>
-        </p:nvSpPr>
-        <p:spPr>
-          <a:xfrm rot="10800000">
-            <a:off x="7163009" y="1483112"/>
+            <a:chOff x="929745" y="1462189"/>
+            <a:chExt cx="4572000" cy="4572000"/>
+          </a:xfrm>
+        </p:grpSpPr>
+        <p:sp>
+          <p:nvSpPr>
+            <p:cNvPr id="53" name="Oval 52">
+              <a:extLst>
+                <a:ext uri="{FF2B5EF4-FFF2-40B4-BE49-F238E27FC236}">
+                  <a16:creationId xmlns:a16="http://schemas.microsoft.com/office/drawing/2014/main" id="{EBDC4950-1801-D547-9EF0-8C1994AAB9D2}"/>
+                </a:ext>
+              </a:extLst>
+            </p:cNvPr>
+            <p:cNvSpPr/>
+            <p:nvPr/>
+          </p:nvSpPr>
+          <p:spPr>
+            <a:xfrm rot="10800000">
+              <a:off x="929745" y="1462189"/>
+              <a:ext cx="4572000" cy="4572000"/>
+            </a:xfrm>
+            <a:prstGeom prst="ellipse">
+              <a:avLst/>
+            </a:prstGeom>
+            <a:gradFill flip="none" rotWithShape="1">
+              <a:gsLst>
+                <a:gs pos="0">
+                  <a:schemeClr val="accent1">
+                    <a:lumMod val="5000"/>
+                    <a:lumOff val="95000"/>
+                    <a:alpha val="0"/>
+                  </a:schemeClr>
+                </a:gs>
+                <a:gs pos="76000">
+                  <a:schemeClr val="accent1">
+                    <a:lumMod val="45000"/>
+                    <a:lumOff val="55000"/>
+                  </a:schemeClr>
+                </a:gs>
+                <a:gs pos="42000">
+                  <a:schemeClr val="accent1">
+                    <a:lumMod val="0"/>
+                    <a:lumOff val="100000"/>
+                    <a:alpha val="71000"/>
+                  </a:schemeClr>
+                </a:gs>
+                <a:gs pos="57000">
+                  <a:schemeClr val="accent1">
+                    <a:lumMod val="30000"/>
+                    <a:lumOff val="70000"/>
+                    <a:alpha val="56000"/>
+                  </a:schemeClr>
+                </a:gs>
+              </a:gsLst>
+              <a:lin ang="0" scaled="1"/>
+              <a:tileRect/>
+            </a:gradFill>
+            <a:ln>
+              <a:noFill/>
+            </a:ln>
+          </p:spPr>
+          <p:style>
+            <a:lnRef idx="2">
+              <a:schemeClr val="accent1">
+                <a:shade val="50000"/>
+              </a:schemeClr>
+            </a:lnRef>
+            <a:fillRef idx="1">
+              <a:schemeClr val="accent1"/>
+            </a:fillRef>
+            <a:effectRef idx="0">
+              <a:schemeClr val="accent1"/>
+            </a:effectRef>
+            <a:fontRef idx="minor">
+              <a:schemeClr val="lt1"/>
+            </a:fontRef>
+          </p:style>
+          <p:txBody>
+            <a:bodyPr rtlCol="0" anchor="ctr"/>
+            <a:lstStyle/>
+            <a:p>
+              <a:pPr algn="ctr"/>
+              <a:endParaRPr lang="en-US" dirty="0"/>
+            </a:p>
+          </p:txBody>
+        </p:sp>
+        <p:cxnSp>
+          <p:nvCxnSpPr>
+            <p:cNvPr id="54" name="Straight Arrow Connector 53">
+              <a:extLst>
+                <a:ext uri="{FF2B5EF4-FFF2-40B4-BE49-F238E27FC236}">
+                  <a16:creationId xmlns:a16="http://schemas.microsoft.com/office/drawing/2014/main" id="{9E7C2E64-7B42-B84D-8BCB-FFDAD40B5FE5}"/>
+                </a:ext>
+              </a:extLst>
+            </p:cNvPr>
+            <p:cNvCxnSpPr>
+              <a:cxnSpLocks/>
+            </p:cNvCxnSpPr>
+            <p:nvPr/>
+          </p:nvCxnSpPr>
+          <p:spPr>
+            <a:xfrm flipH="1">
+              <a:off x="2033250" y="3752715"/>
+              <a:ext cx="1180530" cy="0"/>
+            </a:xfrm>
+            <a:prstGeom prst="straightConnector1">
+              <a:avLst/>
+            </a:prstGeom>
+            <a:ln w="38100" cmpd="dbl">
+              <a:solidFill>
+                <a:schemeClr val="tx1"/>
+              </a:solidFill>
+              <a:tailEnd type="triangle"/>
+            </a:ln>
+          </p:spPr>
+          <p:style>
+            <a:lnRef idx="1">
+              <a:schemeClr val="accent1"/>
+            </a:lnRef>
+            <a:fillRef idx="0">
+              <a:schemeClr val="accent1"/>
+            </a:fillRef>
+            <a:effectRef idx="0">
+              <a:schemeClr val="accent1"/>
+            </a:effectRef>
+            <a:fontRef idx="minor">
+              <a:schemeClr val="tx1"/>
+            </a:fontRef>
+          </p:style>
+        </p:cxnSp>
+      </p:grpSp>
+      <p:grpSp>
+        <p:nvGrpSpPr>
+          <p:cNvPr id="51" name="Group 50">
+            <a:extLst>
+              <a:ext uri="{FF2B5EF4-FFF2-40B4-BE49-F238E27FC236}">
+                <a16:creationId xmlns:a16="http://schemas.microsoft.com/office/drawing/2014/main" id="{C72D08D4-271F-6745-A737-5EB2121B513D}"/>
+              </a:ext>
+            </a:extLst>
+          </p:cNvPr>
+          <p:cNvGrpSpPr/>
+          <p:nvPr/>
+        </p:nvGrpSpPr>
+        <p:grpSpPr>
+          <a:xfrm>
+            <a:off x="929745" y="1462189"/>
             <a:ext cx="4572000" cy="4572000"/>
-          </a:xfrm>
-          <a:prstGeom prst="ellipse">
-            <a:avLst/>
-          </a:prstGeom>
-          <a:gradFill flip="none" rotWithShape="1">
-            <a:gsLst>
-              <a:gs pos="0">
-                <a:schemeClr val="accent1">
-                  <a:lumMod val="5000"/>
-                  <a:lumOff val="95000"/>
-                  <a:alpha val="0"/>
-                </a:schemeClr>
-              </a:gs>
-              <a:gs pos="76000">
-                <a:schemeClr val="accent1">
-                  <a:lumMod val="45000"/>
-                  <a:lumOff val="55000"/>
-                </a:schemeClr>
-              </a:gs>
-              <a:gs pos="42000">
-                <a:schemeClr val="accent1">
-                  <a:lumMod val="0"/>
-                  <a:lumOff val="100000"/>
-                  <a:alpha val="71000"/>
-                </a:schemeClr>
-              </a:gs>
-              <a:gs pos="57000">
-                <a:schemeClr val="accent1">
-                  <a:lumMod val="30000"/>
-                  <a:lumOff val="70000"/>
-                  <a:alpha val="56000"/>
-                </a:schemeClr>
-              </a:gs>
-            </a:gsLst>
-            <a:lin ang="0" scaled="1"/>
-            <a:tileRect/>
-          </a:gradFill>
-          <a:ln>
-            <a:noFill/>
-          </a:ln>
-        </p:spPr>
-        <p:style>
-          <a:lnRef idx="2">
-            <a:schemeClr val="accent1">
-              <a:shade val="50000"/>
-            </a:schemeClr>
-          </a:lnRef>
-          <a:fillRef idx="1">
-            <a:schemeClr val="accent1"/>
-          </a:fillRef>
-          <a:effectRef idx="0">
-            <a:schemeClr val="accent1"/>
-          </a:effectRef>
-          <a:fontRef idx="minor">
-            <a:schemeClr val="lt1"/>
-          </a:fontRef>
-        </p:style>
-        <p:txBody>
-          <a:bodyPr rtlCol="0" anchor="ctr"/>
-          <a:lstStyle/>
-          <a:p>
-            <a:pPr algn="ctr"/>
-            <a:endParaRPr lang="en-US"/>
-          </a:p>
-        </p:txBody>
-      </p:sp>
+            <a:chOff x="929745" y="1462189"/>
+            <a:chExt cx="4572000" cy="4572000"/>
+          </a:xfrm>
+        </p:grpSpPr>
+        <p:sp>
+          <p:nvSpPr>
+            <p:cNvPr id="8" name="Oval 7">
+              <a:extLst>
+                <a:ext uri="{FF2B5EF4-FFF2-40B4-BE49-F238E27FC236}">
+                  <a16:creationId xmlns:a16="http://schemas.microsoft.com/office/drawing/2014/main" id="{8C0BB476-4275-2048-AF81-6398B3822C4E}"/>
+                </a:ext>
+              </a:extLst>
+            </p:cNvPr>
+            <p:cNvSpPr/>
+            <p:nvPr/>
+          </p:nvSpPr>
+          <p:spPr>
+            <a:xfrm rot="10800000">
+              <a:off x="929745" y="1462189"/>
+              <a:ext cx="4572000" cy="4572000"/>
+            </a:xfrm>
+            <a:prstGeom prst="ellipse">
+              <a:avLst/>
+            </a:prstGeom>
+            <a:gradFill flip="none" rotWithShape="1">
+              <a:gsLst>
+                <a:gs pos="0">
+                  <a:schemeClr val="accent1">
+                    <a:lumMod val="5000"/>
+                    <a:lumOff val="95000"/>
+                    <a:alpha val="0"/>
+                  </a:schemeClr>
+                </a:gs>
+                <a:gs pos="76000">
+                  <a:schemeClr val="accent1">
+                    <a:lumMod val="45000"/>
+                    <a:lumOff val="55000"/>
+                  </a:schemeClr>
+                </a:gs>
+                <a:gs pos="42000">
+                  <a:schemeClr val="accent1">
+                    <a:lumMod val="0"/>
+                    <a:lumOff val="100000"/>
+                    <a:alpha val="71000"/>
+                  </a:schemeClr>
+                </a:gs>
+                <a:gs pos="57000">
+                  <a:schemeClr val="accent1">
+                    <a:lumMod val="30000"/>
+                    <a:lumOff val="70000"/>
+                    <a:alpha val="56000"/>
+                  </a:schemeClr>
+                </a:gs>
+              </a:gsLst>
+              <a:lin ang="0" scaled="1"/>
+              <a:tileRect/>
+            </a:gradFill>
+            <a:ln>
+              <a:noFill/>
+            </a:ln>
+          </p:spPr>
+          <p:style>
+            <a:lnRef idx="2">
+              <a:schemeClr val="accent1">
+                <a:shade val="50000"/>
+              </a:schemeClr>
+            </a:lnRef>
+            <a:fillRef idx="1">
+              <a:schemeClr val="accent1"/>
+            </a:fillRef>
+            <a:effectRef idx="0">
+              <a:schemeClr val="accent1"/>
+            </a:effectRef>
+            <a:fontRef idx="minor">
+              <a:schemeClr val="lt1"/>
+            </a:fontRef>
+          </p:style>
+          <p:txBody>
+            <a:bodyPr rtlCol="0" anchor="ctr"/>
+            <a:lstStyle/>
+            <a:p>
+              <a:pPr algn="ctr"/>
+              <a:endParaRPr lang="en-US" dirty="0"/>
+            </a:p>
+          </p:txBody>
+        </p:sp>
+        <p:cxnSp>
+          <p:nvCxnSpPr>
+            <p:cNvPr id="19" name="Straight Arrow Connector 18">
+              <a:extLst>
+                <a:ext uri="{FF2B5EF4-FFF2-40B4-BE49-F238E27FC236}">
+                  <a16:creationId xmlns:a16="http://schemas.microsoft.com/office/drawing/2014/main" id="{85763B0D-1C84-9D4D-A4F5-6D901CB02F04}"/>
+                </a:ext>
+              </a:extLst>
+            </p:cNvPr>
+            <p:cNvCxnSpPr>
+              <a:cxnSpLocks/>
+            </p:cNvCxnSpPr>
+            <p:nvPr/>
+          </p:nvCxnSpPr>
+          <p:spPr>
+            <a:xfrm flipH="1">
+              <a:off x="2033250" y="3752715"/>
+              <a:ext cx="1180530" cy="0"/>
+            </a:xfrm>
+            <a:prstGeom prst="straightConnector1">
+              <a:avLst/>
+            </a:prstGeom>
+            <a:ln w="38100" cmpd="dbl">
+              <a:solidFill>
+                <a:schemeClr val="tx1"/>
+              </a:solidFill>
+              <a:tailEnd type="triangle"/>
+            </a:ln>
+          </p:spPr>
+          <p:style>
+            <a:lnRef idx="1">
+              <a:schemeClr val="accent1"/>
+            </a:lnRef>
+            <a:fillRef idx="0">
+              <a:schemeClr val="accent1"/>
+            </a:fillRef>
+            <a:effectRef idx="0">
+              <a:schemeClr val="accent1"/>
+            </a:effectRef>
+            <a:fontRef idx="minor">
+              <a:schemeClr val="tx1"/>
+            </a:fontRef>
+          </p:style>
+        </p:cxnSp>
+      </p:grpSp>
       <p:sp>
         <p:nvSpPr>
           <p:cNvPr id="2" name="Title 1">
@@ -16999,6 +17352,66 @@
           </a:fontRef>
         </p:style>
       </p:cxnSp>
+      <p:pic>
+        <p:nvPicPr>
+          <p:cNvPr id="47" name="Picture 46">
+            <a:extLst>
+              <a:ext uri="{FF2B5EF4-FFF2-40B4-BE49-F238E27FC236}">
+                <a16:creationId xmlns:a16="http://schemas.microsoft.com/office/drawing/2014/main" id="{42CBAEF4-831C-AC4F-83FE-E814CC87496F}"/>
+              </a:ext>
+            </a:extLst>
+          </p:cNvPr>
+          <p:cNvPicPr>
+            <a:picLocks noChangeAspect="1"/>
+          </p:cNvPicPr>
+          <p:nvPr/>
+        </p:nvPicPr>
+        <p:blipFill>
+          <a:blip r:embed="rId6"/>
+          <a:stretch>
+            <a:fillRect/>
+          </a:stretch>
+        </p:blipFill>
+        <p:spPr>
+          <a:xfrm>
+            <a:off x="3289539" y="3821458"/>
+            <a:ext cx="127000" cy="203200"/>
+          </a:xfrm>
+          <a:prstGeom prst="rect">
+            <a:avLst/>
+          </a:prstGeom>
+        </p:spPr>
+      </p:pic>
+      <p:pic>
+        <p:nvPicPr>
+          <p:cNvPr id="55" name="Picture 54">
+            <a:extLst>
+              <a:ext uri="{FF2B5EF4-FFF2-40B4-BE49-F238E27FC236}">
+                <a16:creationId xmlns:a16="http://schemas.microsoft.com/office/drawing/2014/main" id="{421D500A-523F-5645-A455-4EF9C9CAA549}"/>
+              </a:ext>
+            </a:extLst>
+          </p:cNvPr>
+          <p:cNvPicPr>
+            <a:picLocks noChangeAspect="1"/>
+          </p:cNvPicPr>
+          <p:nvPr/>
+        </p:nvPicPr>
+        <p:blipFill>
+          <a:blip r:embed="rId6"/>
+          <a:stretch>
+            <a:fillRect/>
+          </a:stretch>
+        </p:blipFill>
+        <p:spPr>
+          <a:xfrm>
+            <a:off x="9529927" y="3830220"/>
+            <a:ext cx="127000" cy="203200"/>
+          </a:xfrm>
+          <a:prstGeom prst="rect">
+            <a:avLst/>
+          </a:prstGeom>
+        </p:spPr>
+      </p:pic>
     </p:spTree>
     <p:extLst>
       <p:ext uri="{BB962C8B-B14F-4D97-AF65-F5344CB8AC3E}">
@@ -17030,16 +17443,16 @@
                             </p:stCondLst>
                             <p:childTnLst>
                               <p:par>
-                                <p:cTn id="5" presetID="8" presetClass="emph" presetSubtype="0" fill="hold" grpId="0" nodeType="clickEffect">
+                                <p:cTn id="5" presetID="8" presetClass="emph" presetSubtype="0" fill="hold" nodeType="clickEffect">
                                   <p:stCondLst>
                                     <p:cond delay="0"/>
                                   </p:stCondLst>
                                   <p:childTnLst>
                                     <p:animRot by="21600000">
                                       <p:cBhvr>
-                                        <p:cTn id="6" dur="10000" fill="hold"/>
+                                        <p:cTn id="6" dur="7000" fill="hold"/>
                                         <p:tgtEl>
-                                          <p:spTgt spid="38"/>
+                                          <p:spTgt spid="52"/>
                                         </p:tgtEl>
                                         <p:attrNameLst>
                                           <p:attrName>r</p:attrName>
@@ -17050,16 +17463,16 @@
                                 </p:cTn>
                               </p:par>
                               <p:par>
-                                <p:cTn id="7" presetID="8" presetClass="emph" presetSubtype="0" fill="hold" grpId="0" nodeType="withEffect">
+                                <p:cTn id="7" presetID="8" presetClass="emph" presetSubtype="0" fill="hold" nodeType="withEffect">
                                   <p:stCondLst>
                                     <p:cond delay="0"/>
                                   </p:stCondLst>
                                   <p:childTnLst>
                                     <p:animRot by="21600000">
                                       <p:cBhvr>
-                                        <p:cTn id="8" dur="10000" fill="hold"/>
+                                        <p:cTn id="8" dur="7000" fill="hold"/>
                                         <p:tgtEl>
-                                          <p:spTgt spid="8"/>
+                                          <p:spTgt spid="51"/>
                                         </p:tgtEl>
                                         <p:attrNameLst>
                                           <p:attrName>r</p:attrName>
@@ -17096,10 +17509,6 @@
         </p:cTn>
       </p:par>
     </p:tnLst>
-    <p:bldLst>
-      <p:bldP spid="8" grpId="0" animBg="1"/>
-      <p:bldP spid="38" grpId="0" animBg="1"/>
-    </p:bldLst>
   </p:timing>
 </p:sld>
 </file>

</xml_diff>